<commit_message>
2020-01-18 / 황세준 / Commit
</commit_message>
<xml_diff>
--- a/docs/마리아DB 정리.pptx
+++ b/docs/마리아DB 정리.pptx
@@ -264,7 +264,7 @@
           <a:p>
             <a:fld id="{4487A7D5-BEB9-4F0F-96DA-B93C3377B38E}" type="datetimeFigureOut">
               <a:rPr lang="ko-KR" altLang="en-US" smtClean="0"/>
-              <a:t>2021-01-11</a:t>
+              <a:t>2021-01-18</a:t>
             </a:fld>
             <a:endParaRPr lang="ko-KR" altLang="en-US"/>
           </a:p>
@@ -434,7 +434,7 @@
           <a:p>
             <a:fld id="{4487A7D5-BEB9-4F0F-96DA-B93C3377B38E}" type="datetimeFigureOut">
               <a:rPr lang="ko-KR" altLang="en-US" smtClean="0"/>
-              <a:t>2021-01-11</a:t>
+              <a:t>2021-01-18</a:t>
             </a:fld>
             <a:endParaRPr lang="ko-KR" altLang="en-US"/>
           </a:p>
@@ -614,7 +614,7 @@
           <a:p>
             <a:fld id="{4487A7D5-BEB9-4F0F-96DA-B93C3377B38E}" type="datetimeFigureOut">
               <a:rPr lang="ko-KR" altLang="en-US" smtClean="0"/>
-              <a:t>2021-01-11</a:t>
+              <a:t>2021-01-18</a:t>
             </a:fld>
             <a:endParaRPr lang="ko-KR" altLang="en-US"/>
           </a:p>
@@ -784,7 +784,7 @@
           <a:p>
             <a:fld id="{4487A7D5-BEB9-4F0F-96DA-B93C3377B38E}" type="datetimeFigureOut">
               <a:rPr lang="ko-KR" altLang="en-US" smtClean="0"/>
-              <a:t>2021-01-11</a:t>
+              <a:t>2021-01-18</a:t>
             </a:fld>
             <a:endParaRPr lang="ko-KR" altLang="en-US"/>
           </a:p>
@@ -1030,7 +1030,7 @@
           <a:p>
             <a:fld id="{4487A7D5-BEB9-4F0F-96DA-B93C3377B38E}" type="datetimeFigureOut">
               <a:rPr lang="ko-KR" altLang="en-US" smtClean="0"/>
-              <a:t>2021-01-11</a:t>
+              <a:t>2021-01-18</a:t>
             </a:fld>
             <a:endParaRPr lang="ko-KR" altLang="en-US"/>
           </a:p>
@@ -1262,7 +1262,7 @@
           <a:p>
             <a:fld id="{4487A7D5-BEB9-4F0F-96DA-B93C3377B38E}" type="datetimeFigureOut">
               <a:rPr lang="ko-KR" altLang="en-US" smtClean="0"/>
-              <a:t>2021-01-11</a:t>
+              <a:t>2021-01-18</a:t>
             </a:fld>
             <a:endParaRPr lang="ko-KR" altLang="en-US"/>
           </a:p>
@@ -1629,7 +1629,7 @@
           <a:p>
             <a:fld id="{4487A7D5-BEB9-4F0F-96DA-B93C3377B38E}" type="datetimeFigureOut">
               <a:rPr lang="ko-KR" altLang="en-US" smtClean="0"/>
-              <a:t>2021-01-11</a:t>
+              <a:t>2021-01-18</a:t>
             </a:fld>
             <a:endParaRPr lang="ko-KR" altLang="en-US"/>
           </a:p>
@@ -1747,7 +1747,7 @@
           <a:p>
             <a:fld id="{4487A7D5-BEB9-4F0F-96DA-B93C3377B38E}" type="datetimeFigureOut">
               <a:rPr lang="ko-KR" altLang="en-US" smtClean="0"/>
-              <a:t>2021-01-11</a:t>
+              <a:t>2021-01-18</a:t>
             </a:fld>
             <a:endParaRPr lang="ko-KR" altLang="en-US"/>
           </a:p>
@@ -1842,7 +1842,7 @@
           <a:p>
             <a:fld id="{4487A7D5-BEB9-4F0F-96DA-B93C3377B38E}" type="datetimeFigureOut">
               <a:rPr lang="ko-KR" altLang="en-US" smtClean="0"/>
-              <a:t>2021-01-11</a:t>
+              <a:t>2021-01-18</a:t>
             </a:fld>
             <a:endParaRPr lang="ko-KR" altLang="en-US"/>
           </a:p>
@@ -2119,7 +2119,7 @@
           <a:p>
             <a:fld id="{4487A7D5-BEB9-4F0F-96DA-B93C3377B38E}" type="datetimeFigureOut">
               <a:rPr lang="ko-KR" altLang="en-US" smtClean="0"/>
-              <a:t>2021-01-11</a:t>
+              <a:t>2021-01-18</a:t>
             </a:fld>
             <a:endParaRPr lang="ko-KR" altLang="en-US"/>
           </a:p>
@@ -2372,7 +2372,7 @@
           <a:p>
             <a:fld id="{4487A7D5-BEB9-4F0F-96DA-B93C3377B38E}" type="datetimeFigureOut">
               <a:rPr lang="ko-KR" altLang="en-US" smtClean="0"/>
-              <a:t>2021-01-11</a:t>
+              <a:t>2021-01-18</a:t>
             </a:fld>
             <a:endParaRPr lang="ko-KR" altLang="en-US"/>
           </a:p>
@@ -2585,7 +2585,7 @@
           <a:p>
             <a:fld id="{4487A7D5-BEB9-4F0F-96DA-B93C3377B38E}" type="datetimeFigureOut">
               <a:rPr lang="ko-KR" altLang="en-US" smtClean="0"/>
-              <a:t>2021-01-11</a:t>
+              <a:t>2021-01-18</a:t>
             </a:fld>
             <a:endParaRPr lang="ko-KR" altLang="en-US"/>
           </a:p>
@@ -3192,22 +3192,202 @@
       </p:pic>
       <p:sp>
         <p:nvSpPr>
-          <p:cNvPr id="13" name="직사각형 12"/>
-          <p:cNvSpPr/>
+          <p:cNvPr id="5" name="TextBox 4"/>
+          <p:cNvSpPr txBox="1"/>
           <p:nvPr/>
         </p:nvSpPr>
         <p:spPr>
           <a:xfrm>
-            <a:off x="2163778" y="6266980"/>
-            <a:ext cx="2353901" cy="248154"/>
+            <a:off x="163044" y="200921"/>
+            <a:ext cx="10008295" cy="461665"/>
           </a:xfrm>
           <a:prstGeom prst="rect">
             <a:avLst/>
           </a:prstGeom>
           <a:noFill/>
-          <a:ln w="38100">
+        </p:spPr>
+        <p:txBody>
+          <a:bodyPr wrap="square" rtlCol="0">
+            <a:spAutoFit/>
+          </a:bodyPr>
+          <a:lstStyle/>
+          <a:p>
+            <a:r>
+              <a:rPr lang="en-US" altLang="ko-KR" sz="2400" b="1" dirty="0" smtClean="0"/>
+              <a:t>0. </a:t>
+            </a:r>
+            <a:r>
+              <a:rPr lang="ko-KR" altLang="en-US" sz="2400" b="1" dirty="0" smtClean="0"/>
+              <a:t>경로</a:t>
+            </a:r>
+            <a:endParaRPr lang="ko-KR" altLang="en-US" sz="2400" b="1" dirty="0"/>
+          </a:p>
+        </p:txBody>
+      </p:sp>
+      <p:sp>
+        <p:nvSpPr>
+          <p:cNvPr id="14" name="TextBox 13"/>
+          <p:cNvSpPr txBox="1"/>
+          <p:nvPr/>
+        </p:nvSpPr>
+        <p:spPr>
+          <a:xfrm>
+            <a:off x="7589519" y="1087997"/>
+            <a:ext cx="4394130" cy="854080"/>
+          </a:xfrm>
+          <a:prstGeom prst="rect">
+            <a:avLst/>
+          </a:prstGeom>
+          <a:noFill/>
+        </p:spPr>
+        <p:txBody>
+          <a:bodyPr wrap="square" rtlCol="0">
+            <a:spAutoFit/>
+          </a:bodyPr>
+          <a:lstStyle/>
+          <a:p>
+            <a:pPr algn="just">
+              <a:lnSpc>
+                <a:spcPct val="150000"/>
+              </a:lnSpc>
+            </a:pPr>
+            <a:r>
+              <a:rPr lang="ko-KR" altLang="en-US" sz="1100" dirty="0" smtClean="0"/>
+              <a:t>외부 접근 허용 설정을 하기 위해서는 </a:t>
+            </a:r>
+            <a:r>
+              <a:rPr lang="en-US" altLang="ko-KR" sz="1100" dirty="0" smtClean="0"/>
+              <a:t>/</a:t>
+            </a:r>
+            <a:r>
+              <a:rPr lang="en-US" altLang="ko-KR" sz="1100" dirty="0" err="1" smtClean="0"/>
+              <a:t>etc</a:t>
+            </a:r>
+            <a:r>
+              <a:rPr lang="en-US" altLang="ko-KR" sz="1100" dirty="0" smtClean="0"/>
+              <a:t>/</a:t>
+            </a:r>
+            <a:r>
+              <a:rPr lang="en-US" altLang="ko-KR" sz="1100" dirty="0" err="1" smtClean="0"/>
+              <a:t>mysql</a:t>
+            </a:r>
+            <a:r>
+              <a:rPr lang="en-US" altLang="ko-KR" sz="1100" dirty="0" smtClean="0"/>
+              <a:t>/</a:t>
+            </a:r>
+            <a:r>
+              <a:rPr lang="en-US" altLang="ko-KR" sz="1100" dirty="0" err="1" smtClean="0"/>
+              <a:t>mariadb.conf.d</a:t>
+            </a:r>
+            <a:r>
+              <a:rPr lang="en-US" altLang="ko-KR" sz="1100" dirty="0" smtClean="0"/>
+              <a:t> </a:t>
+            </a:r>
+            <a:r>
+              <a:rPr lang="ko-KR" altLang="en-US" sz="1100" dirty="0" smtClean="0"/>
+              <a:t>경로로 이동해야 한다</a:t>
+            </a:r>
+            <a:r>
+              <a:rPr lang="en-US" altLang="ko-KR" sz="1100" dirty="0" smtClean="0"/>
+              <a:t>. </a:t>
+            </a:r>
+            <a:r>
+              <a:rPr lang="ko-KR" altLang="en-US" sz="1100" dirty="0" smtClean="0"/>
+              <a:t>서버 환경</a:t>
+            </a:r>
+            <a:r>
+              <a:rPr lang="en-US" altLang="ko-KR" sz="1100" dirty="0" smtClean="0"/>
+              <a:t> </a:t>
+            </a:r>
+            <a:r>
+              <a:rPr lang="ko-KR" altLang="en-US" sz="1100" dirty="0" smtClean="0"/>
+              <a:t>설정이 되어 있는 </a:t>
+            </a:r>
+            <a:r>
+              <a:rPr lang="en-US" altLang="ko-KR" sz="1100" dirty="0" err="1" smtClean="0"/>
+              <a:t>Config</a:t>
+            </a:r>
+            <a:r>
+              <a:rPr lang="en-US" altLang="ko-KR" sz="1100" dirty="0" smtClean="0"/>
+              <a:t> </a:t>
+            </a:r>
+            <a:r>
+              <a:rPr lang="ko-KR" altLang="en-US" sz="1100" dirty="0" smtClean="0"/>
+              <a:t>파일이 있기 때문</a:t>
+            </a:r>
+            <a:r>
+              <a:rPr lang="en-US" altLang="ko-KR" sz="1100" dirty="0" smtClean="0"/>
+              <a:t>.</a:t>
+            </a:r>
+            <a:r>
+              <a:rPr lang="ko-KR" altLang="en-US" sz="1100" dirty="0"/>
+              <a:t> </a:t>
+            </a:r>
+            <a:r>
+              <a:rPr lang="en-US" altLang="ko-KR" sz="1100" dirty="0" smtClean="0"/>
+              <a:t>“ 50-server.cnf “ </a:t>
+            </a:r>
+          </a:p>
+        </p:txBody>
+      </p:sp>
+      <p:cxnSp>
+        <p:nvCxnSpPr>
+          <p:cNvPr id="16" name="꺾인 연결선 15"/>
+          <p:cNvCxnSpPr>
+            <a:stCxn id="13" idx="3"/>
+            <a:endCxn id="14" idx="1"/>
+          </p:cNvCxnSpPr>
+          <p:nvPr/>
+        </p:nvCxnSpPr>
+        <p:spPr>
+          <a:xfrm flipV="1">
+            <a:off x="4517679" y="1515037"/>
+            <a:ext cx="3071840" cy="4876020"/>
+          </a:xfrm>
+          <a:prstGeom prst="bentConnector3">
+            <a:avLst>
+              <a:gd name="adj1" fmla="val 50000"/>
+            </a:avLst>
+          </a:prstGeom>
+          <a:ln>
+            <a:tailEnd type="triangle"/>
+          </a:ln>
+        </p:spPr>
+        <p:style>
+          <a:lnRef idx="1">
+            <a:schemeClr val="accent1"/>
+          </a:lnRef>
+          <a:fillRef idx="0">
+            <a:schemeClr val="accent1"/>
+          </a:fillRef>
+          <a:effectRef idx="0">
+            <a:schemeClr val="accent1"/>
+          </a:effectRef>
+          <a:fontRef idx="minor">
+            <a:schemeClr val="tx1"/>
+          </a:fontRef>
+        </p:style>
+      </p:cxnSp>
+      <p:sp>
+        <p:nvSpPr>
+          <p:cNvPr id="7" name="직사각형 6"/>
+          <p:cNvSpPr/>
+          <p:nvPr/>
+        </p:nvSpPr>
+        <p:spPr>
+          <a:xfrm>
+            <a:off x="1230923" y="1169378"/>
+            <a:ext cx="905608" cy="237392"/>
+          </a:xfrm>
+          <a:prstGeom prst="rect">
+            <a:avLst/>
+          </a:prstGeom>
+          <a:solidFill>
+            <a:schemeClr val="bg1"/>
+          </a:solidFill>
+          <a:ln>
             <a:solidFill>
-              <a:srgbClr val="00B0F0"/>
+              <a:schemeClr val="bg1"/>
             </a:solidFill>
           </a:ln>
         </p:spPr>
@@ -3238,182 +3418,242 @@
       </p:sp>
       <p:sp>
         <p:nvSpPr>
-          <p:cNvPr id="5" name="TextBox 4"/>
-          <p:cNvSpPr txBox="1"/>
+          <p:cNvPr id="8" name="직사각형 7"/>
+          <p:cNvSpPr/>
           <p:nvPr/>
         </p:nvSpPr>
         <p:spPr>
           <a:xfrm>
-            <a:off x="163044" y="200921"/>
-            <a:ext cx="10008295" cy="461665"/>
+            <a:off x="3793403" y="2508038"/>
+            <a:ext cx="1376474" cy="305500"/>
           </a:xfrm>
           <a:prstGeom prst="rect">
             <a:avLst/>
           </a:prstGeom>
-          <a:noFill/>
-        </p:spPr>
-        <p:txBody>
-          <a:bodyPr wrap="square" rtlCol="0">
-            <a:spAutoFit/>
-          </a:bodyPr>
-          <a:lstStyle/>
-          <a:p>
-            <a:r>
-              <a:rPr lang="en-US" altLang="ko-KR" sz="2400" b="1" dirty="0" smtClean="0"/>
-              <a:t>0. </a:t>
-            </a:r>
-            <a:r>
-              <a:rPr lang="ko-KR" altLang="en-US" sz="2400" b="1" dirty="0" smtClean="0"/>
-              <a:t>경로</a:t>
-            </a:r>
-            <a:endParaRPr lang="ko-KR" altLang="en-US" sz="2400" b="1" dirty="0"/>
-          </a:p>
-        </p:txBody>
-      </p:sp>
-      <p:sp>
-        <p:nvSpPr>
-          <p:cNvPr id="14" name="TextBox 13"/>
-          <p:cNvSpPr txBox="1"/>
-          <p:nvPr/>
-        </p:nvSpPr>
-        <p:spPr>
-          <a:xfrm>
-            <a:off x="7589519" y="1087997"/>
-            <a:ext cx="4394130" cy="854080"/>
-          </a:xfrm>
-          <a:prstGeom prst="rect">
-            <a:avLst/>
-          </a:prstGeom>
-          <a:noFill/>
-        </p:spPr>
-        <p:txBody>
-          <a:bodyPr wrap="square" rtlCol="0">
-            <a:spAutoFit/>
-          </a:bodyPr>
-          <a:lstStyle/>
-          <a:p>
-            <a:pPr algn="just">
-              <a:lnSpc>
-                <a:spcPct val="150000"/>
-              </a:lnSpc>
-            </a:pPr>
-            <a:r>
-              <a:rPr lang="ko-KR" altLang="en-US" sz="1100" dirty="0" smtClean="0"/>
-              <a:t>외부 접근 허용 설정을 하기 위해서는 </a:t>
-            </a:r>
-            <a:r>
-              <a:rPr lang="en-US" altLang="ko-KR" sz="1100" dirty="0" smtClean="0"/>
-              <a:t>/</a:t>
-            </a:r>
-            <a:r>
-              <a:rPr lang="en-US" altLang="ko-KR" sz="1100" dirty="0" err="1" smtClean="0"/>
-              <a:t>etc</a:t>
-            </a:r>
-            <a:r>
-              <a:rPr lang="en-US" altLang="ko-KR" sz="1100" dirty="0" smtClean="0"/>
-              <a:t>/</a:t>
-            </a:r>
-            <a:r>
-              <a:rPr lang="en-US" altLang="ko-KR" sz="1100" dirty="0" err="1" smtClean="0"/>
-              <a:t>mysql</a:t>
-            </a:r>
-            <a:r>
-              <a:rPr lang="en-US" altLang="ko-KR" sz="1100" dirty="0" smtClean="0"/>
-              <a:t>/</a:t>
-            </a:r>
-            <a:r>
-              <a:rPr lang="en-US" altLang="ko-KR" sz="1100" dirty="0" err="1" smtClean="0"/>
-              <a:t>mariadb.conf.d</a:t>
-            </a:r>
-            <a:r>
-              <a:rPr lang="en-US" altLang="ko-KR" sz="1100" dirty="0" smtClean="0"/>
-              <a:t> </a:t>
-            </a:r>
-            <a:r>
-              <a:rPr lang="ko-KR" altLang="en-US" sz="1100" dirty="0" smtClean="0"/>
-              <a:t>경로로 이동해야 한다</a:t>
-            </a:r>
-            <a:r>
-              <a:rPr lang="en-US" altLang="ko-KR" sz="1100" dirty="0" smtClean="0"/>
-              <a:t>. </a:t>
-            </a:r>
-            <a:r>
-              <a:rPr lang="ko-KR" altLang="en-US" sz="1100" dirty="0" smtClean="0"/>
-              <a:t>서버 환경</a:t>
-            </a:r>
-            <a:r>
-              <a:rPr lang="en-US" altLang="ko-KR" sz="1100" dirty="0" smtClean="0"/>
-              <a:t> </a:t>
-            </a:r>
-            <a:r>
-              <a:rPr lang="ko-KR" altLang="en-US" sz="1100" dirty="0" smtClean="0"/>
-              <a:t>설정이 되어 있는 </a:t>
-            </a:r>
-            <a:r>
-              <a:rPr lang="en-US" altLang="ko-KR" sz="1100" dirty="0" err="1" smtClean="0"/>
-              <a:t>Config</a:t>
-            </a:r>
-            <a:r>
-              <a:rPr lang="en-US" altLang="ko-KR" sz="1100" dirty="0" smtClean="0"/>
-              <a:t> </a:t>
-            </a:r>
-            <a:r>
-              <a:rPr lang="ko-KR" altLang="en-US" sz="1100" dirty="0" smtClean="0"/>
-              <a:t>파일이 있기 때문</a:t>
-            </a:r>
-            <a:r>
-              <a:rPr lang="en-US" altLang="ko-KR" sz="1100" dirty="0" smtClean="0"/>
-              <a:t>.</a:t>
-            </a:r>
-            <a:r>
-              <a:rPr lang="ko-KR" altLang="en-US" sz="1100" dirty="0"/>
-              <a:t> </a:t>
-            </a:r>
-            <a:r>
-              <a:rPr lang="en-US" altLang="ko-KR" sz="1100" dirty="0" smtClean="0"/>
-              <a:t>“ 50-server.cnf “ </a:t>
-            </a:r>
-          </a:p>
-        </p:txBody>
-      </p:sp>
-      <p:cxnSp>
-        <p:nvCxnSpPr>
-          <p:cNvPr id="16" name="꺾인 연결선 15"/>
-          <p:cNvCxnSpPr>
-            <a:stCxn id="13" idx="3"/>
-            <a:endCxn id="14" idx="1"/>
-          </p:cNvCxnSpPr>
-          <p:nvPr/>
-        </p:nvCxnSpPr>
-        <p:spPr>
-          <a:xfrm flipV="1">
-            <a:off x="4517679" y="1515037"/>
-            <a:ext cx="3071840" cy="4876020"/>
-          </a:xfrm>
-          <a:prstGeom prst="bentConnector3">
-            <a:avLst>
-              <a:gd name="adj1" fmla="val 50000"/>
-            </a:avLst>
-          </a:prstGeom>
+          <a:solidFill>
+            <a:schemeClr val="tx1"/>
+          </a:solidFill>
           <a:ln>
-            <a:tailEnd type="triangle"/>
+            <a:solidFill>
+              <a:schemeClr val="tx1"/>
+            </a:solidFill>
           </a:ln>
         </p:spPr>
         <p:style>
-          <a:lnRef idx="1">
-            <a:schemeClr val="accent1"/>
+          <a:lnRef idx="2">
+            <a:schemeClr val="accent1">
+              <a:shade val="50000"/>
+            </a:schemeClr>
           </a:lnRef>
-          <a:fillRef idx="0">
+          <a:fillRef idx="1">
             <a:schemeClr val="accent1"/>
           </a:fillRef>
           <a:effectRef idx="0">
             <a:schemeClr val="accent1"/>
           </a:effectRef>
           <a:fontRef idx="minor">
-            <a:schemeClr val="tx1"/>
+            <a:schemeClr val="lt1"/>
           </a:fontRef>
         </p:style>
-      </p:cxnSp>
+        <p:txBody>
+          <a:bodyPr rtlCol="0" anchor="ctr"/>
+          <a:lstStyle/>
+          <a:p>
+            <a:pPr algn="ctr"/>
+            <a:endParaRPr lang="ko-KR" altLang="en-US"/>
+          </a:p>
+        </p:txBody>
+      </p:sp>
+      <p:sp>
+        <p:nvSpPr>
+          <p:cNvPr id="11" name="직사각형 10"/>
+          <p:cNvSpPr/>
+          <p:nvPr/>
+        </p:nvSpPr>
+        <p:spPr>
+          <a:xfrm>
+            <a:off x="1079511" y="6266980"/>
+            <a:ext cx="1084267" cy="248154"/>
+          </a:xfrm>
+          <a:prstGeom prst="rect">
+            <a:avLst/>
+          </a:prstGeom>
+          <a:solidFill>
+            <a:schemeClr val="tx1"/>
+          </a:solidFill>
+          <a:ln>
+            <a:solidFill>
+              <a:schemeClr val="tx1"/>
+            </a:solidFill>
+          </a:ln>
+        </p:spPr>
+        <p:style>
+          <a:lnRef idx="2">
+            <a:schemeClr val="accent1">
+              <a:shade val="50000"/>
+            </a:schemeClr>
+          </a:lnRef>
+          <a:fillRef idx="1">
+            <a:schemeClr val="accent1"/>
+          </a:fillRef>
+          <a:effectRef idx="0">
+            <a:schemeClr val="accent1"/>
+          </a:effectRef>
+          <a:fontRef idx="minor">
+            <a:schemeClr val="lt1"/>
+          </a:fontRef>
+        </p:style>
+        <p:txBody>
+          <a:bodyPr rtlCol="0" anchor="ctr"/>
+          <a:lstStyle/>
+          <a:p>
+            <a:pPr algn="ctr"/>
+            <a:endParaRPr lang="ko-KR" altLang="en-US"/>
+          </a:p>
+        </p:txBody>
+      </p:sp>
+      <p:sp>
+        <p:nvSpPr>
+          <p:cNvPr id="9" name="직사각형 8"/>
+          <p:cNvSpPr/>
+          <p:nvPr/>
+        </p:nvSpPr>
+        <p:spPr>
+          <a:xfrm>
+            <a:off x="1079511" y="2758518"/>
+            <a:ext cx="1057020" cy="450674"/>
+          </a:xfrm>
+          <a:prstGeom prst="rect">
+            <a:avLst/>
+          </a:prstGeom>
+          <a:solidFill>
+            <a:schemeClr val="tx1"/>
+          </a:solidFill>
+          <a:ln>
+            <a:solidFill>
+              <a:schemeClr val="tx1"/>
+            </a:solidFill>
+          </a:ln>
+        </p:spPr>
+        <p:style>
+          <a:lnRef idx="2">
+            <a:schemeClr val="accent1">
+              <a:shade val="50000"/>
+            </a:schemeClr>
+          </a:lnRef>
+          <a:fillRef idx="1">
+            <a:schemeClr val="accent1"/>
+          </a:fillRef>
+          <a:effectRef idx="0">
+            <a:schemeClr val="accent1"/>
+          </a:effectRef>
+          <a:fontRef idx="minor">
+            <a:schemeClr val="lt1"/>
+          </a:fontRef>
+        </p:style>
+        <p:txBody>
+          <a:bodyPr rtlCol="0" anchor="ctr"/>
+          <a:lstStyle/>
+          <a:p>
+            <a:pPr algn="ctr"/>
+            <a:endParaRPr lang="ko-KR" altLang="en-US"/>
+          </a:p>
+        </p:txBody>
+      </p:sp>
+      <p:sp>
+        <p:nvSpPr>
+          <p:cNvPr id="10" name="직사각형 9"/>
+          <p:cNvSpPr/>
+          <p:nvPr/>
+        </p:nvSpPr>
+        <p:spPr>
+          <a:xfrm>
+            <a:off x="1079511" y="4862116"/>
+            <a:ext cx="1057020" cy="450674"/>
+          </a:xfrm>
+          <a:prstGeom prst="rect">
+            <a:avLst/>
+          </a:prstGeom>
+          <a:solidFill>
+            <a:schemeClr val="tx1"/>
+          </a:solidFill>
+          <a:ln>
+            <a:solidFill>
+              <a:schemeClr val="tx1"/>
+            </a:solidFill>
+          </a:ln>
+        </p:spPr>
+        <p:style>
+          <a:lnRef idx="2">
+            <a:schemeClr val="accent1">
+              <a:shade val="50000"/>
+            </a:schemeClr>
+          </a:lnRef>
+          <a:fillRef idx="1">
+            <a:schemeClr val="accent1"/>
+          </a:fillRef>
+          <a:effectRef idx="0">
+            <a:schemeClr val="accent1"/>
+          </a:effectRef>
+          <a:fontRef idx="minor">
+            <a:schemeClr val="lt1"/>
+          </a:fontRef>
+        </p:style>
+        <p:txBody>
+          <a:bodyPr rtlCol="0" anchor="ctr"/>
+          <a:lstStyle/>
+          <a:p>
+            <a:pPr algn="ctr"/>
+            <a:endParaRPr lang="ko-KR" altLang="en-US"/>
+          </a:p>
+        </p:txBody>
+      </p:sp>
+      <p:sp>
+        <p:nvSpPr>
+          <p:cNvPr id="13" name="직사각형 12"/>
+          <p:cNvSpPr/>
+          <p:nvPr/>
+        </p:nvSpPr>
+        <p:spPr>
+          <a:xfrm>
+            <a:off x="2163778" y="6266980"/>
+            <a:ext cx="2353901" cy="248154"/>
+          </a:xfrm>
+          <a:prstGeom prst="rect">
+            <a:avLst/>
+          </a:prstGeom>
+          <a:noFill/>
+          <a:ln w="38100">
+            <a:solidFill>
+              <a:srgbClr val="00B0F0"/>
+            </a:solidFill>
+          </a:ln>
+        </p:spPr>
+        <p:style>
+          <a:lnRef idx="2">
+            <a:schemeClr val="accent1">
+              <a:shade val="50000"/>
+            </a:schemeClr>
+          </a:lnRef>
+          <a:fillRef idx="1">
+            <a:schemeClr val="accent1"/>
+          </a:fillRef>
+          <a:effectRef idx="0">
+            <a:schemeClr val="accent1"/>
+          </a:effectRef>
+          <a:fontRef idx="minor">
+            <a:schemeClr val="lt1"/>
+          </a:fontRef>
+        </p:style>
+        <p:txBody>
+          <a:bodyPr rtlCol="0" anchor="ctr"/>
+          <a:lstStyle/>
+          <a:p>
+            <a:pPr algn="ctr"/>
+            <a:endParaRPr lang="ko-KR" altLang="en-US"/>
+          </a:p>
+        </p:txBody>
+      </p:sp>
     </p:spTree>
     <p:extLst>
       <p:ext uri="{BB962C8B-B14F-4D97-AF65-F5344CB8AC3E}">
@@ -3542,11 +3782,7 @@
             </a:r>
             <a:r>
               <a:rPr lang="en-US" altLang="ko-KR" sz="2400" b="1" dirty="0" smtClean="0"/>
-              <a:t>. </a:t>
-            </a:r>
-            <a:r>
-              <a:rPr lang="en-US" altLang="ko-KR" sz="2400" b="1" dirty="0" smtClean="0"/>
-              <a:t>50-server.cnf </a:t>
+              <a:t>. 50-server.cnf </a:t>
             </a:r>
             <a:r>
               <a:rPr lang="ko-KR" altLang="en-US" sz="2400" b="1" dirty="0" smtClean="0"/>
@@ -3746,6 +3982,54 @@
           </a:fontRef>
         </p:style>
       </p:cxnSp>
+      <p:sp>
+        <p:nvSpPr>
+          <p:cNvPr id="7" name="직사각형 6"/>
+          <p:cNvSpPr/>
+          <p:nvPr/>
+        </p:nvSpPr>
+        <p:spPr>
+          <a:xfrm>
+            <a:off x="1230923" y="1169378"/>
+            <a:ext cx="905608" cy="237392"/>
+          </a:xfrm>
+          <a:prstGeom prst="rect">
+            <a:avLst/>
+          </a:prstGeom>
+          <a:solidFill>
+            <a:schemeClr val="bg1"/>
+          </a:solidFill>
+          <a:ln>
+            <a:solidFill>
+              <a:schemeClr val="bg1"/>
+            </a:solidFill>
+          </a:ln>
+        </p:spPr>
+        <p:style>
+          <a:lnRef idx="2">
+            <a:schemeClr val="accent1">
+              <a:shade val="50000"/>
+            </a:schemeClr>
+          </a:lnRef>
+          <a:fillRef idx="1">
+            <a:schemeClr val="accent1"/>
+          </a:fillRef>
+          <a:effectRef idx="0">
+            <a:schemeClr val="accent1"/>
+          </a:effectRef>
+          <a:fontRef idx="minor">
+            <a:schemeClr val="lt1"/>
+          </a:fontRef>
+        </p:style>
+        <p:txBody>
+          <a:bodyPr rtlCol="0" anchor="ctr"/>
+          <a:lstStyle/>
+          <a:p>
+            <a:pPr algn="ctr"/>
+            <a:endParaRPr lang="ko-KR" altLang="en-US"/>
+          </a:p>
+        </p:txBody>
+      </p:sp>
     </p:spTree>
     <p:extLst>
       <p:ext uri="{BB962C8B-B14F-4D97-AF65-F5344CB8AC3E}">
@@ -3802,22 +4086,201 @@
       </p:pic>
       <p:sp>
         <p:nvSpPr>
-          <p:cNvPr id="13" name="직사각형 12"/>
-          <p:cNvSpPr/>
+          <p:cNvPr id="5" name="TextBox 4"/>
+          <p:cNvSpPr txBox="1"/>
           <p:nvPr/>
         </p:nvSpPr>
         <p:spPr>
           <a:xfrm>
-            <a:off x="1647813" y="4619249"/>
-            <a:ext cx="5576852" cy="248154"/>
+            <a:off x="163044" y="200921"/>
+            <a:ext cx="10008295" cy="461665"/>
           </a:xfrm>
           <a:prstGeom prst="rect">
             <a:avLst/>
           </a:prstGeom>
           <a:noFill/>
-          <a:ln w="38100">
+        </p:spPr>
+        <p:txBody>
+          <a:bodyPr wrap="square" rtlCol="0">
+            <a:spAutoFit/>
+          </a:bodyPr>
+          <a:lstStyle/>
+          <a:p>
+            <a:r>
+              <a:rPr lang="en-US" altLang="ko-KR" sz="2400" b="1" dirty="0" smtClean="0"/>
+              <a:t>2. </a:t>
+            </a:r>
+            <a:r>
+              <a:rPr lang="ko-KR" altLang="en-US" sz="2400" b="1" dirty="0" smtClean="0"/>
+              <a:t>권한 부여</a:t>
+            </a:r>
+            <a:endParaRPr lang="ko-KR" altLang="en-US" sz="2400" b="1" dirty="0"/>
+          </a:p>
+        </p:txBody>
+      </p:sp>
+      <p:sp>
+        <p:nvSpPr>
+          <p:cNvPr id="14" name="TextBox 13"/>
+          <p:cNvSpPr txBox="1"/>
+          <p:nvPr/>
+        </p:nvSpPr>
+        <p:spPr>
+          <a:xfrm>
+            <a:off x="7589519" y="1087997"/>
+            <a:ext cx="4394130" cy="1107996"/>
+          </a:xfrm>
+          <a:prstGeom prst="rect">
+            <a:avLst/>
+          </a:prstGeom>
+          <a:noFill/>
+        </p:spPr>
+        <p:txBody>
+          <a:bodyPr wrap="square" rtlCol="0">
+            <a:spAutoFit/>
+          </a:bodyPr>
+          <a:lstStyle/>
+          <a:p>
+            <a:pPr marL="228600" indent="-228600" algn="just">
+              <a:lnSpc>
+                <a:spcPct val="150000"/>
+              </a:lnSpc>
+              <a:buAutoNum type="arabicParenR"/>
+            </a:pPr>
+            <a:r>
+              <a:rPr lang="en-US" altLang="ko-KR" sz="1100" dirty="0" err="1" smtClean="0"/>
+              <a:t>mariaDB</a:t>
+            </a:r>
+            <a:r>
+              <a:rPr lang="en-US" altLang="ko-KR" sz="1100" dirty="0" smtClean="0"/>
+              <a:t> </a:t>
+            </a:r>
+            <a:r>
+              <a:rPr lang="ko-KR" altLang="en-US" sz="1100" dirty="0" smtClean="0"/>
+              <a:t>실행 </a:t>
+            </a:r>
+            <a:r>
+              <a:rPr lang="en-US" altLang="ko-KR" sz="1100" dirty="0" smtClean="0"/>
+              <a:t>&gt; use </a:t>
+            </a:r>
+            <a:r>
+              <a:rPr lang="en-US" altLang="ko-KR" sz="1100" dirty="0" err="1" smtClean="0"/>
+              <a:t>mysql</a:t>
+            </a:r>
+            <a:r>
+              <a:rPr lang="en-US" altLang="ko-KR" sz="1100" dirty="0" smtClean="0"/>
+              <a:t> </a:t>
+            </a:r>
+            <a:r>
+              <a:rPr lang="ko-KR" altLang="en-US" sz="1100" dirty="0" smtClean="0"/>
+              <a:t>데이터 베이스 사용</a:t>
+            </a:r>
+            <a:endParaRPr lang="en-US" altLang="ko-KR" sz="1100" dirty="0" smtClean="0"/>
+          </a:p>
+          <a:p>
+            <a:pPr marL="228600" indent="-228600" algn="just">
+              <a:lnSpc>
+                <a:spcPct val="150000"/>
+              </a:lnSpc>
+              <a:buAutoNum type="arabicParenR"/>
+            </a:pPr>
+            <a:r>
+              <a:rPr lang="en-US" altLang="ko-KR" sz="1100" dirty="0" smtClean="0"/>
+              <a:t>grant all privileges on *.* to root@’%’ identified by ‘</a:t>
+            </a:r>
+            <a:r>
+              <a:rPr lang="ko-KR" altLang="en-US" sz="1100" dirty="0" smtClean="0"/>
+              <a:t>비밀번호</a:t>
+            </a:r>
+            <a:r>
+              <a:rPr lang="en-US" altLang="ko-KR" sz="1100" dirty="0" smtClean="0"/>
+              <a:t>‘ </a:t>
+            </a:r>
+            <a:r>
+              <a:rPr lang="ko-KR" altLang="en-US" sz="1100" dirty="0" smtClean="0"/>
+              <a:t>명령어를 사용하여 권한 부여</a:t>
+            </a:r>
+            <a:endParaRPr lang="en-US" altLang="ko-KR" sz="1100" dirty="0" smtClean="0"/>
+          </a:p>
+          <a:p>
+            <a:pPr marL="228600" indent="-228600" algn="just">
+              <a:lnSpc>
+                <a:spcPct val="150000"/>
+              </a:lnSpc>
+              <a:buAutoNum type="arabicParenR"/>
+            </a:pPr>
+            <a:r>
+              <a:rPr lang="en-US" altLang="ko-KR" sz="1100" dirty="0" smtClean="0"/>
+              <a:t>flush privileges </a:t>
+            </a:r>
+            <a:r>
+              <a:rPr lang="ko-KR" altLang="en-US" sz="1100" dirty="0" smtClean="0"/>
+              <a:t>명령어로 권한 저장</a:t>
+            </a:r>
+            <a:endParaRPr lang="en-US" altLang="ko-KR" sz="1100" dirty="0" smtClean="0"/>
+          </a:p>
+        </p:txBody>
+      </p:sp>
+      <p:cxnSp>
+        <p:nvCxnSpPr>
+          <p:cNvPr id="16" name="꺾인 연결선 15"/>
+          <p:cNvCxnSpPr>
+            <a:stCxn id="13" idx="3"/>
+            <a:endCxn id="14" idx="1"/>
+          </p:cNvCxnSpPr>
+          <p:nvPr/>
+        </p:nvCxnSpPr>
+        <p:spPr>
+          <a:xfrm flipV="1">
+            <a:off x="7224665" y="1641995"/>
+            <a:ext cx="364854" cy="3101331"/>
+          </a:xfrm>
+          <a:prstGeom prst="bentConnector3">
+            <a:avLst>
+              <a:gd name="adj1" fmla="val 50000"/>
+            </a:avLst>
+          </a:prstGeom>
+          <a:ln w="19050">
             <a:solidFill>
-              <a:srgbClr val="00B0F0"/>
+              <a:schemeClr val="accent1"/>
+            </a:solidFill>
+            <a:tailEnd type="triangle"/>
+          </a:ln>
+        </p:spPr>
+        <p:style>
+          <a:lnRef idx="1">
+            <a:schemeClr val="accent1"/>
+          </a:lnRef>
+          <a:fillRef idx="0">
+            <a:schemeClr val="accent1"/>
+          </a:fillRef>
+          <a:effectRef idx="0">
+            <a:schemeClr val="accent1"/>
+          </a:effectRef>
+          <a:fontRef idx="minor">
+            <a:schemeClr val="tx1"/>
+          </a:fontRef>
+        </p:style>
+      </p:cxnSp>
+      <p:sp>
+        <p:nvSpPr>
+          <p:cNvPr id="2" name="직사각형 1"/>
+          <p:cNvSpPr/>
+          <p:nvPr/>
+        </p:nvSpPr>
+        <p:spPr>
+          <a:xfrm>
+            <a:off x="1230923" y="1169378"/>
+            <a:ext cx="905608" cy="237392"/>
+          </a:xfrm>
+          <a:prstGeom prst="rect">
+            <a:avLst/>
+          </a:prstGeom>
+          <a:solidFill>
+            <a:schemeClr val="bg1"/>
+          </a:solidFill>
+          <a:ln>
+            <a:solidFill>
+              <a:schemeClr val="bg1"/>
             </a:solidFill>
           </a:ln>
         </p:spPr>
@@ -3848,185 +4311,194 @@
       </p:sp>
       <p:sp>
         <p:nvSpPr>
-          <p:cNvPr id="5" name="TextBox 4"/>
-          <p:cNvSpPr txBox="1"/>
+          <p:cNvPr id="9" name="직사각형 8"/>
+          <p:cNvSpPr/>
           <p:nvPr/>
         </p:nvSpPr>
         <p:spPr>
           <a:xfrm>
-            <a:off x="163044" y="200921"/>
-            <a:ext cx="10008295" cy="461665"/>
+            <a:off x="4338283" y="4605863"/>
+            <a:ext cx="427148" cy="261540"/>
           </a:xfrm>
           <a:prstGeom prst="rect">
             <a:avLst/>
           </a:prstGeom>
-          <a:noFill/>
-        </p:spPr>
-        <p:txBody>
-          <a:bodyPr wrap="square" rtlCol="0">
-            <a:spAutoFit/>
-          </a:bodyPr>
-          <a:lstStyle/>
-          <a:p>
-            <a:r>
-              <a:rPr lang="en-US" altLang="ko-KR" sz="2400" b="1" dirty="0" smtClean="0"/>
-              <a:t>2</a:t>
-            </a:r>
-            <a:r>
-              <a:rPr lang="en-US" altLang="ko-KR" sz="2400" b="1" dirty="0" smtClean="0"/>
-              <a:t>. </a:t>
-            </a:r>
-            <a:r>
-              <a:rPr lang="ko-KR" altLang="en-US" sz="2400" b="1" dirty="0" smtClean="0"/>
-              <a:t>권한 부여</a:t>
-            </a:r>
-            <a:endParaRPr lang="ko-KR" altLang="en-US" sz="2400" b="1" dirty="0"/>
-          </a:p>
-        </p:txBody>
-      </p:sp>
-      <p:sp>
-        <p:nvSpPr>
-          <p:cNvPr id="14" name="TextBox 13"/>
-          <p:cNvSpPr txBox="1"/>
-          <p:nvPr/>
-        </p:nvSpPr>
-        <p:spPr>
-          <a:xfrm>
-            <a:off x="7589519" y="1087997"/>
-            <a:ext cx="4394130" cy="1107996"/>
-          </a:xfrm>
-          <a:prstGeom prst="rect">
-            <a:avLst/>
-          </a:prstGeom>
-          <a:noFill/>
-        </p:spPr>
-        <p:txBody>
-          <a:bodyPr wrap="square" rtlCol="0">
-            <a:spAutoFit/>
-          </a:bodyPr>
-          <a:lstStyle/>
-          <a:p>
-            <a:pPr marL="228600" indent="-228600" algn="just">
-              <a:lnSpc>
-                <a:spcPct val="150000"/>
-              </a:lnSpc>
-              <a:buAutoNum type="arabicParenR"/>
-            </a:pPr>
-            <a:r>
-              <a:rPr lang="en-US" altLang="ko-KR" sz="1100" dirty="0" err="1" smtClean="0"/>
-              <a:t>mariaDB</a:t>
-            </a:r>
-            <a:r>
-              <a:rPr lang="en-US" altLang="ko-KR" sz="1100" dirty="0" smtClean="0"/>
-              <a:t> </a:t>
-            </a:r>
-            <a:r>
-              <a:rPr lang="ko-KR" altLang="en-US" sz="1100" dirty="0" smtClean="0"/>
-              <a:t>실행 </a:t>
-            </a:r>
-            <a:r>
-              <a:rPr lang="en-US" altLang="ko-KR" sz="1100" dirty="0" smtClean="0"/>
-              <a:t>&gt; use </a:t>
-            </a:r>
-            <a:r>
-              <a:rPr lang="en-US" altLang="ko-KR" sz="1100" dirty="0" err="1" smtClean="0"/>
-              <a:t>mysql</a:t>
-            </a:r>
-            <a:r>
-              <a:rPr lang="en-US" altLang="ko-KR" sz="1100" dirty="0" smtClean="0"/>
-              <a:t> </a:t>
-            </a:r>
-            <a:r>
-              <a:rPr lang="ko-KR" altLang="en-US" sz="1100" dirty="0" smtClean="0"/>
-              <a:t>데이터 베이스 사용</a:t>
-            </a:r>
-            <a:endParaRPr lang="en-US" altLang="ko-KR" sz="1100" dirty="0" smtClean="0"/>
-          </a:p>
-          <a:p>
-            <a:pPr marL="228600" indent="-228600" algn="just">
-              <a:lnSpc>
-                <a:spcPct val="150000"/>
-              </a:lnSpc>
-              <a:buAutoNum type="arabicParenR"/>
-            </a:pPr>
-            <a:r>
-              <a:rPr lang="en-US" altLang="ko-KR" sz="1100" dirty="0" smtClean="0"/>
-              <a:t>grant all privileges on *.* to root@’%’ identified by ‘</a:t>
-            </a:r>
-            <a:r>
-              <a:rPr lang="ko-KR" altLang="en-US" sz="1100" dirty="0" smtClean="0"/>
-              <a:t>비밀번호</a:t>
-            </a:r>
-            <a:r>
-              <a:rPr lang="en-US" altLang="ko-KR" sz="1100" dirty="0" smtClean="0"/>
-              <a:t>‘ </a:t>
-            </a:r>
-            <a:r>
-              <a:rPr lang="ko-KR" altLang="en-US" sz="1100" dirty="0" smtClean="0"/>
-              <a:t>명령어를 사용하여 권한 부여</a:t>
-            </a:r>
-            <a:endParaRPr lang="en-US" altLang="ko-KR" sz="1100" dirty="0" smtClean="0"/>
-          </a:p>
-          <a:p>
-            <a:pPr marL="228600" indent="-228600" algn="just">
-              <a:lnSpc>
-                <a:spcPct val="150000"/>
-              </a:lnSpc>
-              <a:buAutoNum type="arabicParenR"/>
-            </a:pPr>
-            <a:r>
-              <a:rPr lang="en-US" altLang="ko-KR" sz="1100" dirty="0" smtClean="0"/>
-              <a:t>flush privileges </a:t>
-            </a:r>
-            <a:r>
-              <a:rPr lang="ko-KR" altLang="en-US" sz="1100" dirty="0" smtClean="0"/>
-              <a:t>명령어로 권한 저장</a:t>
-            </a:r>
-            <a:endParaRPr lang="en-US" altLang="ko-KR" sz="1100" dirty="0" smtClean="0"/>
-          </a:p>
-        </p:txBody>
-      </p:sp>
-      <p:cxnSp>
-        <p:nvCxnSpPr>
-          <p:cNvPr id="16" name="꺾인 연결선 15"/>
-          <p:cNvCxnSpPr>
-            <a:stCxn id="13" idx="3"/>
-            <a:endCxn id="14" idx="1"/>
-          </p:cNvCxnSpPr>
-          <p:nvPr/>
-        </p:nvCxnSpPr>
-        <p:spPr>
-          <a:xfrm flipV="1">
-            <a:off x="7224665" y="1641995"/>
-            <a:ext cx="364854" cy="3101331"/>
-          </a:xfrm>
-          <a:prstGeom prst="bentConnector3">
-            <a:avLst>
-              <a:gd name="adj1" fmla="val 50000"/>
-            </a:avLst>
-          </a:prstGeom>
-          <a:ln w="19050">
+          <a:solidFill>
+            <a:schemeClr val="tx1"/>
+          </a:solidFill>
+          <a:ln>
             <a:solidFill>
-              <a:schemeClr val="accent1"/>
+              <a:schemeClr val="tx1"/>
             </a:solidFill>
-            <a:tailEnd type="triangle"/>
           </a:ln>
         </p:spPr>
         <p:style>
-          <a:lnRef idx="1">
-            <a:schemeClr val="accent1"/>
+          <a:lnRef idx="2">
+            <a:schemeClr val="accent1">
+              <a:shade val="50000"/>
+            </a:schemeClr>
           </a:lnRef>
-          <a:fillRef idx="0">
+          <a:fillRef idx="1">
             <a:schemeClr val="accent1"/>
           </a:fillRef>
           <a:effectRef idx="0">
             <a:schemeClr val="accent1"/>
           </a:effectRef>
           <a:fontRef idx="minor">
-            <a:schemeClr val="tx1"/>
+            <a:schemeClr val="lt1"/>
           </a:fontRef>
         </p:style>
-      </p:cxnSp>
+        <p:txBody>
+          <a:bodyPr rtlCol="0" anchor="ctr"/>
+          <a:lstStyle/>
+          <a:p>
+            <a:pPr algn="ctr"/>
+            <a:endParaRPr lang="ko-KR" altLang="en-US"/>
+          </a:p>
+        </p:txBody>
+      </p:sp>
+      <p:sp>
+        <p:nvSpPr>
+          <p:cNvPr id="8" name="직사각형 7"/>
+          <p:cNvSpPr/>
+          <p:nvPr/>
+        </p:nvSpPr>
+        <p:spPr>
+          <a:xfrm>
+            <a:off x="1084385" y="1505715"/>
+            <a:ext cx="1052146" cy="261540"/>
+          </a:xfrm>
+          <a:prstGeom prst="rect">
+            <a:avLst/>
+          </a:prstGeom>
+          <a:solidFill>
+            <a:schemeClr val="tx1"/>
+          </a:solidFill>
+          <a:ln>
+            <a:solidFill>
+              <a:schemeClr val="tx1"/>
+            </a:solidFill>
+          </a:ln>
+        </p:spPr>
+        <p:style>
+          <a:lnRef idx="2">
+            <a:schemeClr val="accent1">
+              <a:shade val="50000"/>
+            </a:schemeClr>
+          </a:lnRef>
+          <a:fillRef idx="1">
+            <a:schemeClr val="accent1"/>
+          </a:fillRef>
+          <a:effectRef idx="0">
+            <a:schemeClr val="accent1"/>
+          </a:effectRef>
+          <a:fontRef idx="minor">
+            <a:schemeClr val="lt1"/>
+          </a:fontRef>
+        </p:style>
+        <p:txBody>
+          <a:bodyPr rtlCol="0" anchor="ctr"/>
+          <a:lstStyle/>
+          <a:p>
+            <a:pPr algn="ctr"/>
+            <a:endParaRPr lang="ko-KR" altLang="en-US"/>
+          </a:p>
+        </p:txBody>
+      </p:sp>
+      <p:sp>
+        <p:nvSpPr>
+          <p:cNvPr id="11" name="직사각형 10"/>
+          <p:cNvSpPr/>
+          <p:nvPr/>
+        </p:nvSpPr>
+        <p:spPr>
+          <a:xfrm>
+            <a:off x="6409593" y="4619249"/>
+            <a:ext cx="815072" cy="248154"/>
+          </a:xfrm>
+          <a:prstGeom prst="rect">
+            <a:avLst/>
+          </a:prstGeom>
+          <a:solidFill>
+            <a:schemeClr val="tx1"/>
+          </a:solidFill>
+          <a:ln>
+            <a:solidFill>
+              <a:schemeClr val="tx1"/>
+            </a:solidFill>
+          </a:ln>
+        </p:spPr>
+        <p:style>
+          <a:lnRef idx="2">
+            <a:schemeClr val="accent1">
+              <a:shade val="50000"/>
+            </a:schemeClr>
+          </a:lnRef>
+          <a:fillRef idx="1">
+            <a:schemeClr val="accent1"/>
+          </a:fillRef>
+          <a:effectRef idx="0">
+            <a:schemeClr val="accent1"/>
+          </a:effectRef>
+          <a:fontRef idx="minor">
+            <a:schemeClr val="lt1"/>
+          </a:fontRef>
+        </p:style>
+        <p:txBody>
+          <a:bodyPr rtlCol="0" anchor="ctr"/>
+          <a:lstStyle/>
+          <a:p>
+            <a:pPr algn="ctr"/>
+            <a:endParaRPr lang="ko-KR" altLang="en-US"/>
+          </a:p>
+        </p:txBody>
+      </p:sp>
+      <p:sp>
+        <p:nvSpPr>
+          <p:cNvPr id="13" name="직사각형 12"/>
+          <p:cNvSpPr/>
+          <p:nvPr/>
+        </p:nvSpPr>
+        <p:spPr>
+          <a:xfrm>
+            <a:off x="1647813" y="4619249"/>
+            <a:ext cx="5576852" cy="248154"/>
+          </a:xfrm>
+          <a:prstGeom prst="rect">
+            <a:avLst/>
+          </a:prstGeom>
+          <a:noFill/>
+          <a:ln w="38100">
+            <a:solidFill>
+              <a:srgbClr val="00B0F0"/>
+            </a:solidFill>
+          </a:ln>
+        </p:spPr>
+        <p:style>
+          <a:lnRef idx="2">
+            <a:schemeClr val="accent1">
+              <a:shade val="50000"/>
+            </a:schemeClr>
+          </a:lnRef>
+          <a:fillRef idx="1">
+            <a:schemeClr val="accent1"/>
+          </a:fillRef>
+          <a:effectRef idx="0">
+            <a:schemeClr val="accent1"/>
+          </a:effectRef>
+          <a:fontRef idx="minor">
+            <a:schemeClr val="lt1"/>
+          </a:fontRef>
+        </p:style>
+        <p:txBody>
+          <a:bodyPr rtlCol="0" anchor="ctr"/>
+          <a:lstStyle/>
+          <a:p>
+            <a:pPr algn="ctr"/>
+            <a:endParaRPr lang="ko-KR" altLang="en-US"/>
+          </a:p>
+        </p:txBody>
+      </p:sp>
     </p:spTree>
     <p:extLst>
       <p:ext uri="{BB962C8B-B14F-4D97-AF65-F5344CB8AC3E}">

</xml_diff>